<commit_message>
penambahan slide pada ppt dan penambahan database dan penambahan readme
</commit_message>
<xml_diff>
--- a/PPt.pptx
+++ b/PPt.pptx
@@ -16,7 +16,8 @@
     <p:sldId id="264" r:id="rId10"/>
     <p:sldId id="262" r:id="rId11"/>
     <p:sldId id="268" r:id="rId12"/>
-    <p:sldId id="266" r:id="rId13"/>
+    <p:sldId id="269" r:id="rId13"/>
+    <p:sldId id="266" r:id="rId14"/>
   </p:sldIdLst>
   <p:sldSz cx="12192000" cy="6858000"/>
   <p:notesSz cx="6858000" cy="9144000"/>
@@ -8625,6 +8626,496 @@
       </p:grpSpPr>
       <p:sp>
         <p:nvSpPr>
+          <p:cNvPr id="10" name="Content Placeholder 2">
+            <a:extLst>
+              <a:ext uri="{FF2B5EF4-FFF2-40B4-BE49-F238E27FC236}">
+                <a16:creationId xmlns:a16="http://schemas.microsoft.com/office/drawing/2014/main" id="{C0E6A054-ED2A-8C4B-EE1F-5ED656031771}"/>
+              </a:ext>
+            </a:extLst>
+          </p:cNvPr>
+          <p:cNvSpPr txBox="1">
+            <a:spLocks/>
+          </p:cNvSpPr>
+          <p:nvPr/>
+        </p:nvSpPr>
+        <p:spPr>
+          <a:xfrm>
+            <a:off x="4244528" y="3609296"/>
+            <a:ext cx="3702937" cy="3124201"/>
+          </a:xfrm>
+          <a:prstGeom prst="rect">
+            <a:avLst/>
+          </a:prstGeom>
+        </p:spPr>
+        <p:txBody>
+          <a:bodyPr vert="horz" lIns="91440" tIns="45720" rIns="91440" bIns="45720" rtlCol="0" anchor="ctr">
+            <a:normAutofit/>
+          </a:bodyPr>
+          <a:lstStyle>
+            <a:lvl1pPr marL="285750" indent="-285750" algn="l" defTabSz="457200" rtl="0" eaLnBrk="1" latinLnBrk="0" hangingPunct="1">
+              <a:spcBef>
+                <a:spcPct val="20000"/>
+              </a:spcBef>
+              <a:spcAft>
+                <a:spcPts val="600"/>
+              </a:spcAft>
+              <a:buClr>
+                <a:schemeClr val="accent1">
+                  <a:lumMod val="75000"/>
+                </a:schemeClr>
+              </a:buClr>
+              <a:buSzPct val="145000"/>
+              <a:buFont typeface="Arial"/>
+              <a:buChar char="•"/>
+              <a:defRPr sz="2400" kern="1200" cap="none">
+                <a:solidFill>
+                  <a:schemeClr val="tx1"/>
+                </a:solidFill>
+                <a:effectLst/>
+                <a:latin typeface="+mn-lt"/>
+                <a:ea typeface="+mn-ea"/>
+                <a:cs typeface="+mn-cs"/>
+              </a:defRPr>
+            </a:lvl1pPr>
+            <a:lvl2pPr marL="742950" indent="-285750" algn="l" defTabSz="457200" rtl="0" eaLnBrk="1" latinLnBrk="0" hangingPunct="1">
+              <a:spcBef>
+                <a:spcPct val="20000"/>
+              </a:spcBef>
+              <a:spcAft>
+                <a:spcPts val="600"/>
+              </a:spcAft>
+              <a:buClr>
+                <a:schemeClr val="accent1">
+                  <a:lumMod val="75000"/>
+                </a:schemeClr>
+              </a:buClr>
+              <a:buSzPct val="145000"/>
+              <a:buFont typeface="Arial"/>
+              <a:buChar char="•"/>
+              <a:defRPr sz="2000" kern="1200" cap="none">
+                <a:solidFill>
+                  <a:schemeClr val="tx1"/>
+                </a:solidFill>
+                <a:effectLst/>
+                <a:latin typeface="+mn-lt"/>
+                <a:ea typeface="+mn-ea"/>
+                <a:cs typeface="+mn-cs"/>
+              </a:defRPr>
+            </a:lvl2pPr>
+            <a:lvl3pPr marL="1200150" indent="-285750" algn="l" defTabSz="457200" rtl="0" eaLnBrk="1" latinLnBrk="0" hangingPunct="1">
+              <a:spcBef>
+                <a:spcPct val="20000"/>
+              </a:spcBef>
+              <a:spcAft>
+                <a:spcPts val="600"/>
+              </a:spcAft>
+              <a:buClr>
+                <a:schemeClr val="accent1">
+                  <a:lumMod val="75000"/>
+                </a:schemeClr>
+              </a:buClr>
+              <a:buSzPct val="145000"/>
+              <a:buFont typeface="Arial"/>
+              <a:buChar char="•"/>
+              <a:defRPr sz="1800" kern="1200" cap="none">
+                <a:solidFill>
+                  <a:schemeClr val="tx1"/>
+                </a:solidFill>
+                <a:effectLst/>
+                <a:latin typeface="+mn-lt"/>
+                <a:ea typeface="+mn-ea"/>
+                <a:cs typeface="+mn-cs"/>
+              </a:defRPr>
+            </a:lvl3pPr>
+            <a:lvl4pPr marL="1543050" indent="-171450" algn="l" defTabSz="457200" rtl="0" eaLnBrk="1" latinLnBrk="0" hangingPunct="1">
+              <a:spcBef>
+                <a:spcPct val="20000"/>
+              </a:spcBef>
+              <a:spcAft>
+                <a:spcPts val="600"/>
+              </a:spcAft>
+              <a:buClr>
+                <a:schemeClr val="accent1">
+                  <a:lumMod val="75000"/>
+                </a:schemeClr>
+              </a:buClr>
+              <a:buSzPct val="145000"/>
+              <a:buFont typeface="Arial"/>
+              <a:buChar char="•"/>
+              <a:defRPr sz="1600" kern="1200" cap="none">
+                <a:solidFill>
+                  <a:schemeClr val="tx1"/>
+                </a:solidFill>
+                <a:effectLst/>
+                <a:latin typeface="+mn-lt"/>
+                <a:ea typeface="+mn-ea"/>
+                <a:cs typeface="+mn-cs"/>
+              </a:defRPr>
+            </a:lvl4pPr>
+            <a:lvl5pPr marL="2000250" indent="-171450" algn="l" defTabSz="457200" rtl="0" eaLnBrk="1" latinLnBrk="0" hangingPunct="1">
+              <a:spcBef>
+                <a:spcPct val="20000"/>
+              </a:spcBef>
+              <a:spcAft>
+                <a:spcPts val="600"/>
+              </a:spcAft>
+              <a:buClr>
+                <a:schemeClr val="accent1">
+                  <a:lumMod val="75000"/>
+                </a:schemeClr>
+              </a:buClr>
+              <a:buSzPct val="145000"/>
+              <a:buFont typeface="Arial"/>
+              <a:buChar char="•"/>
+              <a:defRPr sz="1400" kern="1200" cap="none">
+                <a:solidFill>
+                  <a:schemeClr val="tx1"/>
+                </a:solidFill>
+                <a:effectLst/>
+                <a:latin typeface="+mn-lt"/>
+                <a:ea typeface="+mn-ea"/>
+                <a:cs typeface="+mn-cs"/>
+              </a:defRPr>
+            </a:lvl5pPr>
+            <a:lvl6pPr marL="2514600" indent="-228600" algn="l" defTabSz="457200" rtl="0" eaLnBrk="1" latinLnBrk="0" hangingPunct="1">
+              <a:spcBef>
+                <a:spcPct val="20000"/>
+              </a:spcBef>
+              <a:spcAft>
+                <a:spcPts val="600"/>
+              </a:spcAft>
+              <a:buClr>
+                <a:schemeClr val="accent1">
+                  <a:lumMod val="75000"/>
+                </a:schemeClr>
+              </a:buClr>
+              <a:buSzPct val="145000"/>
+              <a:buFont typeface="Arial"/>
+              <a:buChar char="•"/>
+              <a:defRPr sz="1400" kern="1200" cap="none">
+                <a:solidFill>
+                  <a:schemeClr val="tx1"/>
+                </a:solidFill>
+                <a:effectLst/>
+                <a:latin typeface="+mn-lt"/>
+                <a:ea typeface="+mn-ea"/>
+                <a:cs typeface="+mn-cs"/>
+              </a:defRPr>
+            </a:lvl6pPr>
+            <a:lvl7pPr marL="2971800" indent="-228600" algn="l" defTabSz="457200" rtl="0" eaLnBrk="1" latinLnBrk="0" hangingPunct="1">
+              <a:spcBef>
+                <a:spcPct val="20000"/>
+              </a:spcBef>
+              <a:spcAft>
+                <a:spcPts val="600"/>
+              </a:spcAft>
+              <a:buClr>
+                <a:schemeClr val="accent1">
+                  <a:lumMod val="75000"/>
+                </a:schemeClr>
+              </a:buClr>
+              <a:buSzPct val="145000"/>
+              <a:buFont typeface="Arial"/>
+              <a:buChar char="•"/>
+              <a:defRPr sz="1400" kern="1200" cap="none">
+                <a:solidFill>
+                  <a:schemeClr val="tx1"/>
+                </a:solidFill>
+                <a:effectLst/>
+                <a:latin typeface="+mn-lt"/>
+                <a:ea typeface="+mn-ea"/>
+                <a:cs typeface="+mn-cs"/>
+              </a:defRPr>
+            </a:lvl7pPr>
+            <a:lvl8pPr marL="3429000" indent="-228600" algn="l" defTabSz="457200" rtl="0" eaLnBrk="1" latinLnBrk="0" hangingPunct="1">
+              <a:spcBef>
+                <a:spcPct val="20000"/>
+              </a:spcBef>
+              <a:spcAft>
+                <a:spcPts val="600"/>
+              </a:spcAft>
+              <a:buClr>
+                <a:schemeClr val="accent1">
+                  <a:lumMod val="75000"/>
+                </a:schemeClr>
+              </a:buClr>
+              <a:buSzPct val="145000"/>
+              <a:buFont typeface="Arial"/>
+              <a:buChar char="•"/>
+              <a:defRPr sz="1400" kern="1200" cap="none">
+                <a:solidFill>
+                  <a:schemeClr val="tx1"/>
+                </a:solidFill>
+                <a:effectLst/>
+                <a:latin typeface="+mn-lt"/>
+                <a:ea typeface="+mn-ea"/>
+                <a:cs typeface="+mn-cs"/>
+              </a:defRPr>
+            </a:lvl8pPr>
+            <a:lvl9pPr marL="3886200" indent="-228600" algn="l" defTabSz="457200" rtl="0" eaLnBrk="1" latinLnBrk="0" hangingPunct="1">
+              <a:spcBef>
+                <a:spcPct val="20000"/>
+              </a:spcBef>
+              <a:spcAft>
+                <a:spcPts val="600"/>
+              </a:spcAft>
+              <a:buClr>
+                <a:schemeClr val="accent1">
+                  <a:lumMod val="75000"/>
+                </a:schemeClr>
+              </a:buClr>
+              <a:buSzPct val="145000"/>
+              <a:buFont typeface="Arial"/>
+              <a:buChar char="•"/>
+              <a:defRPr sz="1400" kern="1200" cap="none">
+                <a:solidFill>
+                  <a:schemeClr val="tx1"/>
+                </a:solidFill>
+                <a:effectLst/>
+                <a:latin typeface="+mn-lt"/>
+                <a:ea typeface="+mn-ea"/>
+                <a:cs typeface="+mn-cs"/>
+              </a:defRPr>
+            </a:lvl9pPr>
+          </a:lstStyle>
+          <a:p>
+            <a:r>
+              <a:rPr lang="en-US" dirty="0"/>
+              <a:t>Disini </a:t>
+            </a:r>
+            <a:r>
+              <a:rPr lang="en-US" dirty="0" err="1"/>
+              <a:t>kita</a:t>
+            </a:r>
+            <a:r>
+              <a:rPr lang="en-US" dirty="0"/>
+              <a:t> bisa </a:t>
+            </a:r>
+            <a:r>
+              <a:rPr lang="en-US" dirty="0" err="1"/>
+              <a:t>melihat</a:t>
+            </a:r>
+            <a:r>
+              <a:rPr lang="en-US" dirty="0"/>
+              <a:t> log error yang </a:t>
+            </a:r>
+            <a:r>
+              <a:rPr lang="en-US" dirty="0" err="1"/>
+              <a:t>terjadi</a:t>
+            </a:r>
+            <a:r>
+              <a:rPr lang="en-US" dirty="0"/>
+              <a:t> pada web </a:t>
+            </a:r>
+            <a:r>
+              <a:rPr lang="en-US" dirty="0" err="1"/>
+              <a:t>kita</a:t>
+            </a:r>
+            <a:r>
+              <a:rPr lang="en-US" dirty="0"/>
+              <a:t> dan pada web </a:t>
+            </a:r>
+            <a:r>
+              <a:rPr lang="en-US" dirty="0" err="1"/>
+              <a:t>kita</a:t>
+            </a:r>
+            <a:r>
+              <a:rPr lang="en-US" dirty="0"/>
+              <a:t> </a:t>
+            </a:r>
+            <a:r>
+              <a:rPr lang="en-US" dirty="0" err="1"/>
+              <a:t>tidak</a:t>
+            </a:r>
+            <a:r>
+              <a:rPr lang="en-US" dirty="0"/>
+              <a:t> </a:t>
+            </a:r>
+            <a:r>
+              <a:rPr lang="en-US" dirty="0" err="1"/>
+              <a:t>akan</a:t>
+            </a:r>
+            <a:r>
+              <a:rPr lang="en-US" dirty="0"/>
+              <a:t> muncul error</a:t>
+            </a:r>
+          </a:p>
+        </p:txBody>
+      </p:sp>
+      <p:sp>
+        <p:nvSpPr>
+          <p:cNvPr id="14" name="Title 1">
+            <a:extLst>
+              <a:ext uri="{FF2B5EF4-FFF2-40B4-BE49-F238E27FC236}">
+                <a16:creationId xmlns:a16="http://schemas.microsoft.com/office/drawing/2014/main" id="{83F25D9B-2ED4-77AD-49FD-20F70BD58EE7}"/>
+              </a:ext>
+            </a:extLst>
+          </p:cNvPr>
+          <p:cNvSpPr txBox="1">
+            <a:spLocks/>
+          </p:cNvSpPr>
+          <p:nvPr/>
+        </p:nvSpPr>
+        <p:spPr>
+          <a:xfrm>
+            <a:off x="4518035" y="124503"/>
+            <a:ext cx="3155927" cy="560729"/>
+          </a:xfrm>
+          <a:prstGeom prst="rect">
+            <a:avLst/>
+          </a:prstGeom>
+          <a:effectLst/>
+        </p:spPr>
+        <p:txBody>
+          <a:bodyPr vert="horz" lIns="91440" tIns="45720" rIns="91440" bIns="45720" rtlCol="0" anchor="ctr">
+            <a:normAutofit/>
+          </a:bodyPr>
+          <a:lstStyle>
+            <a:lvl1pPr algn="ctr" defTabSz="457200" rtl="0" eaLnBrk="1" latinLnBrk="0" hangingPunct="1">
+              <a:spcBef>
+                <a:spcPct val="0"/>
+              </a:spcBef>
+              <a:buNone/>
+              <a:defRPr sz="4000" kern="1200" cap="none">
+                <a:ln w="3175" cmpd="sng">
+                  <a:noFill/>
+                </a:ln>
+                <a:solidFill>
+                  <a:schemeClr val="tx1"/>
+                </a:solidFill>
+                <a:effectLst/>
+                <a:latin typeface="+mj-lt"/>
+                <a:ea typeface="+mj-ea"/>
+                <a:cs typeface="+mj-cs"/>
+              </a:defRPr>
+            </a:lvl1pPr>
+            <a:lvl2pPr eaLnBrk="1" hangingPunct="1">
+              <a:defRPr>
+                <a:solidFill>
+                  <a:schemeClr val="tx2"/>
+                </a:solidFill>
+              </a:defRPr>
+            </a:lvl2pPr>
+            <a:lvl3pPr eaLnBrk="1" hangingPunct="1">
+              <a:defRPr>
+                <a:solidFill>
+                  <a:schemeClr val="tx2"/>
+                </a:solidFill>
+              </a:defRPr>
+            </a:lvl3pPr>
+            <a:lvl4pPr eaLnBrk="1" hangingPunct="1">
+              <a:defRPr>
+                <a:solidFill>
+                  <a:schemeClr val="tx2"/>
+                </a:solidFill>
+              </a:defRPr>
+            </a:lvl4pPr>
+            <a:lvl5pPr eaLnBrk="1" hangingPunct="1">
+              <a:defRPr>
+                <a:solidFill>
+                  <a:schemeClr val="tx2"/>
+                </a:solidFill>
+              </a:defRPr>
+            </a:lvl5pPr>
+            <a:lvl6pPr eaLnBrk="1" hangingPunct="1">
+              <a:defRPr>
+                <a:solidFill>
+                  <a:schemeClr val="tx2"/>
+                </a:solidFill>
+              </a:defRPr>
+            </a:lvl6pPr>
+            <a:lvl7pPr eaLnBrk="1" hangingPunct="1">
+              <a:defRPr>
+                <a:solidFill>
+                  <a:schemeClr val="tx2"/>
+                </a:solidFill>
+              </a:defRPr>
+            </a:lvl7pPr>
+            <a:lvl8pPr eaLnBrk="1" hangingPunct="1">
+              <a:defRPr>
+                <a:solidFill>
+                  <a:schemeClr val="tx2"/>
+                </a:solidFill>
+              </a:defRPr>
+            </a:lvl8pPr>
+            <a:lvl9pPr eaLnBrk="1" hangingPunct="1">
+              <a:defRPr>
+                <a:solidFill>
+                  <a:schemeClr val="tx2"/>
+                </a:solidFill>
+              </a:defRPr>
+            </a:lvl9pPr>
+          </a:lstStyle>
+          <a:p>
+            <a:r>
+              <a:rPr lang="en-US" sz="2000" dirty="0"/>
+              <a:t>Bot Telegram</a:t>
+            </a:r>
+          </a:p>
+        </p:txBody>
+      </p:sp>
+      <p:pic>
+        <p:nvPicPr>
+          <p:cNvPr id="12" name="Picture 11">
+            <a:extLst>
+              <a:ext uri="{FF2B5EF4-FFF2-40B4-BE49-F238E27FC236}">
+                <a16:creationId xmlns:a16="http://schemas.microsoft.com/office/drawing/2014/main" id="{A8B39DA2-C0DB-B65F-8E29-A8B6FBF1B862}"/>
+              </a:ext>
+            </a:extLst>
+          </p:cNvPr>
+          <p:cNvPicPr>
+            <a:picLocks noChangeAspect="1"/>
+          </p:cNvPicPr>
+          <p:nvPr/>
+        </p:nvPicPr>
+        <p:blipFill>
+          <a:blip r:embed="rId2"/>
+          <a:stretch>
+            <a:fillRect/>
+          </a:stretch>
+        </p:blipFill>
+        <p:spPr>
+          <a:xfrm>
+            <a:off x="3842781" y="685232"/>
+            <a:ext cx="4506433" cy="2975237"/>
+          </a:xfrm>
+          <a:prstGeom prst="rect">
+            <a:avLst/>
+          </a:prstGeom>
+        </p:spPr>
+      </p:pic>
+    </p:spTree>
+    <p:extLst>
+      <p:ext uri="{BB962C8B-B14F-4D97-AF65-F5344CB8AC3E}">
+        <p14:creationId xmlns:p14="http://schemas.microsoft.com/office/powerpoint/2010/main" val="2343226376"/>
+      </p:ext>
+    </p:extLst>
+  </p:cSld>
+  <p:clrMapOvr>
+    <a:masterClrMapping/>
+  </p:clrMapOvr>
+</p:sld>
+</file>
+
+<file path=ppt/slides/slide13.xml><?xml version="1.0" encoding="utf-8"?>
+<p:sld xmlns:a="http://schemas.openxmlformats.org/drawingml/2006/main" xmlns:r="http://schemas.openxmlformats.org/officeDocument/2006/relationships" xmlns:p="http://schemas.openxmlformats.org/presentationml/2006/main">
+  <p:cSld>
+    <p:spTree>
+      <p:nvGrpSpPr>
+        <p:cNvPr id="1" name=""/>
+        <p:cNvGrpSpPr/>
+        <p:nvPr/>
+      </p:nvGrpSpPr>
+      <p:grpSpPr>
+        <a:xfrm>
+          <a:off x="0" y="0"/>
+          <a:ext cx="0" cy="0"/>
+          <a:chOff x="0" y="0"/>
+          <a:chExt cx="0" cy="0"/>
+        </a:xfrm>
+      </p:grpSpPr>
+      <p:sp>
+        <p:nvSpPr>
           <p:cNvPr id="2" name="Title 1">
             <a:extLst>
               <a:ext uri="{FF2B5EF4-FFF2-40B4-BE49-F238E27FC236}">

</xml_diff>